<commit_message>
Apresentação da Monografia Corrigida
</commit_message>
<xml_diff>
--- a/Monografia/Apresentação Monografia.pptx
+++ b/Monografia/Apresentação Monografia.pptx
@@ -38,8 +38,9 @@
     <p:sldId id="294" r:id="rId32"/>
     <p:sldId id="295" r:id="rId33"/>
     <p:sldId id="296" r:id="rId34"/>
-    <p:sldId id="261" r:id="rId35"/>
-    <p:sldId id="268" r:id="rId36"/>
+    <p:sldId id="297" r:id="rId35"/>
+    <p:sldId id="261" r:id="rId36"/>
+    <p:sldId id="268" r:id="rId37"/>
   </p:sldIdLst>
   <p:sldSz cx="12192000" cy="6858000"/>
   <p:notesSz cx="6858000" cy="9144000"/>
@@ -490,7 +491,7 @@
           <a:p>
             <a:fld id="{8A281212-8BEE-4784-849A-E77959838720}" type="datetimeFigureOut">
               <a:rPr lang="pt-BR" smtClean="0"/>
-              <a:t>13/12/2019</a:t>
+              <a:t>14/12/2019</a:t>
             </a:fld>
             <a:endParaRPr lang="pt-BR"/>
           </a:p>
@@ -698,7 +699,7 @@
           <a:p>
             <a:fld id="{8A281212-8BEE-4784-849A-E77959838720}" type="datetimeFigureOut">
               <a:rPr lang="pt-BR" smtClean="0"/>
-              <a:t>13/12/2019</a:t>
+              <a:t>14/12/2019</a:t>
             </a:fld>
             <a:endParaRPr lang="pt-BR"/>
           </a:p>
@@ -896,7 +897,7 @@
           <a:p>
             <a:fld id="{8A281212-8BEE-4784-849A-E77959838720}" type="datetimeFigureOut">
               <a:rPr lang="pt-BR" smtClean="0"/>
-              <a:t>13/12/2019</a:t>
+              <a:t>14/12/2019</a:t>
             </a:fld>
             <a:endParaRPr lang="pt-BR"/>
           </a:p>
@@ -1171,7 +1172,7 @@
           <a:p>
             <a:fld id="{8A281212-8BEE-4784-849A-E77959838720}" type="datetimeFigureOut">
               <a:rPr lang="pt-BR" smtClean="0"/>
-              <a:t>13/12/2019</a:t>
+              <a:t>14/12/2019</a:t>
             </a:fld>
             <a:endParaRPr lang="pt-BR"/>
           </a:p>
@@ -1436,7 +1437,7 @@
           <a:p>
             <a:fld id="{8A281212-8BEE-4784-849A-E77959838720}" type="datetimeFigureOut">
               <a:rPr lang="pt-BR" smtClean="0"/>
-              <a:t>13/12/2019</a:t>
+              <a:t>14/12/2019</a:t>
             </a:fld>
             <a:endParaRPr lang="pt-BR"/>
           </a:p>
@@ -1848,7 +1849,7 @@
           <a:p>
             <a:fld id="{8A281212-8BEE-4784-849A-E77959838720}" type="datetimeFigureOut">
               <a:rPr lang="pt-BR" smtClean="0"/>
-              <a:t>13/12/2019</a:t>
+              <a:t>14/12/2019</a:t>
             </a:fld>
             <a:endParaRPr lang="pt-BR"/>
           </a:p>
@@ -1989,7 +1990,7 @@
           <a:p>
             <a:fld id="{8A281212-8BEE-4784-849A-E77959838720}" type="datetimeFigureOut">
               <a:rPr lang="pt-BR" smtClean="0"/>
-              <a:t>13/12/2019</a:t>
+              <a:t>14/12/2019</a:t>
             </a:fld>
             <a:endParaRPr lang="pt-BR"/>
           </a:p>
@@ -2102,7 +2103,7 @@
           <a:p>
             <a:fld id="{8A281212-8BEE-4784-849A-E77959838720}" type="datetimeFigureOut">
               <a:rPr lang="pt-BR" smtClean="0"/>
-              <a:t>13/12/2019</a:t>
+              <a:t>14/12/2019</a:t>
             </a:fld>
             <a:endParaRPr lang="pt-BR"/>
           </a:p>
@@ -2413,7 +2414,7 @@
           <a:p>
             <a:fld id="{8A281212-8BEE-4784-849A-E77959838720}" type="datetimeFigureOut">
               <a:rPr lang="pt-BR" smtClean="0"/>
-              <a:t>13/12/2019</a:t>
+              <a:t>14/12/2019</a:t>
             </a:fld>
             <a:endParaRPr lang="pt-BR"/>
           </a:p>
@@ -2701,7 +2702,7 @@
           <a:p>
             <a:fld id="{8A281212-8BEE-4784-849A-E77959838720}" type="datetimeFigureOut">
               <a:rPr lang="pt-BR" smtClean="0"/>
-              <a:t>13/12/2019</a:t>
+              <a:t>14/12/2019</a:t>
             </a:fld>
             <a:endParaRPr lang="pt-BR"/>
           </a:p>
@@ -6849,8 +6850,8 @@
         </p:nvSpPr>
         <p:spPr>
           <a:xfrm>
-            <a:off x="846356" y="1118932"/>
-            <a:ext cx="8117169" cy="5693866"/>
+            <a:off x="846356" y="942763"/>
+            <a:ext cx="8117169" cy="5886227"/>
           </a:xfrm>
           <a:prstGeom prst="rect">
             <a:avLst/>
@@ -6912,7 +6913,7 @@
           </a:p>
           <a:p>
             <a:pPr lvl="1"/>
-            <a:endParaRPr lang="pt-BR" dirty="0">
+            <a:endParaRPr lang="pt-BR" sz="1050" dirty="0">
               <a:latin typeface="Trebuchet MS" panose="020B0603020202020204" pitchFamily="34" charset="0"/>
             </a:endParaRPr>
           </a:p>
@@ -7013,11 +7014,7 @@
             </a:r>
           </a:p>
           <a:p>
-            <a:pPr marL="285750" indent="-285750">
-              <a:buFont typeface="Arial" panose="020B0604020202020204" pitchFamily="34" charset="0"/>
-              <a:buChar char="•"/>
-            </a:pPr>
-            <a:endParaRPr lang="pt-BR" dirty="0">
+            <a:endParaRPr lang="pt-BR" sz="1000" dirty="0">
               <a:latin typeface="Trebuchet MS" panose="020B0603020202020204" pitchFamily="34" charset="0"/>
             </a:endParaRPr>
           </a:p>
@@ -7091,7 +7088,7 @@
             </a:r>
           </a:p>
           <a:p>
-            <a:endParaRPr lang="pt-BR" dirty="0">
+            <a:endParaRPr lang="pt-BR" sz="1000" dirty="0">
               <a:latin typeface="Trebuchet MS" panose="020B0603020202020204" pitchFamily="34" charset="0"/>
             </a:endParaRPr>
           </a:p>
@@ -7104,6 +7101,36 @@
               <a:rPr lang="pt-BR" dirty="0">
                 <a:latin typeface="Trebuchet MS" panose="020B0603020202020204" pitchFamily="34" charset="0"/>
               </a:rPr>
+              <a:t>PROTÓTIPO</a:t>
+            </a:r>
+          </a:p>
+          <a:p>
+            <a:pPr marL="742950" lvl="1" indent="-285750">
+              <a:buFont typeface="Arial" panose="020B0604020202020204" pitchFamily="34" charset="0"/>
+              <a:buChar char="•"/>
+            </a:pPr>
+            <a:r>
+              <a:rPr lang="pt-BR" sz="1400" dirty="0">
+                <a:latin typeface="Trebuchet MS" panose="020B0603020202020204" pitchFamily="34" charset="0"/>
+              </a:rPr>
+              <a:t>Apresentação do Protótipo</a:t>
+            </a:r>
+          </a:p>
+          <a:p>
+            <a:pPr lvl="1"/>
+            <a:endParaRPr lang="pt-BR" sz="1000" dirty="0">
+              <a:latin typeface="Trebuchet MS" panose="020B0603020202020204" pitchFamily="34" charset="0"/>
+            </a:endParaRPr>
+          </a:p>
+          <a:p>
+            <a:pPr marL="285750" indent="-285750">
+              <a:buFont typeface="Arial" panose="020B0604020202020204" pitchFamily="34" charset="0"/>
+              <a:buChar char="•"/>
+            </a:pPr>
+            <a:r>
+              <a:rPr lang="pt-BR" dirty="0">
+                <a:latin typeface="Trebuchet MS" panose="020B0603020202020204" pitchFamily="34" charset="0"/>
+              </a:rPr>
               <a:t>CONCLUSÃO</a:t>
             </a:r>
           </a:p>
@@ -7116,7 +7143,7 @@
               <a:rPr lang="pt-BR" sz="1400" dirty="0">
                 <a:latin typeface="Trebuchet MS" panose="020B0603020202020204" pitchFamily="34" charset="0"/>
               </a:rPr>
-              <a:t>Situação Atual</a:t>
+              <a:t>Conclusão</a:t>
             </a:r>
           </a:p>
           <a:p>
@@ -9908,7 +9935,7 @@
               <a:rPr lang="pt-BR" dirty="0">
                 <a:latin typeface="Trebuchet MS" panose="020B0603020202020204" pitchFamily="34" charset="0"/>
               </a:rPr>
-              <a:t>Removido de operação devido a falta de suporte e atualização;</a:t>
+              <a:t>Removido de operação devido à falta de suporte e atualização;</a:t>
             </a:r>
           </a:p>
           <a:p>
@@ -11065,14 +11092,11 @@
           </a:bodyPr>
           <a:lstStyle/>
           <a:p>
-            <a:pPr marL="0" indent="0">
-              <a:buNone/>
-            </a:pPr>
             <a:r>
               <a:rPr lang="pt-BR" sz="1400" b="1" dirty="0">
                 <a:latin typeface="Trebuchet MS" panose="020B0603020202020204" pitchFamily="34" charset="0"/>
               </a:rPr>
-              <a:t>CONCLUSÃO</a:t>
+              <a:t>Protótipo</a:t>
             </a:r>
           </a:p>
           <a:p>
@@ -11099,10 +11123,10 @@
       </p:sp>
       <p:sp>
         <p:nvSpPr>
-          <p:cNvPr id="5" name="CaixaDeTexto 4">
-            <a:extLst>
-              <a:ext uri="{FF2B5EF4-FFF2-40B4-BE49-F238E27FC236}">
-                <a16:creationId xmlns:a16="http://schemas.microsoft.com/office/drawing/2014/main" id="{2423AE67-F059-4ADA-8CBA-9B51FE24A270}"/>
+          <p:cNvPr id="6" name="CaixaDeTexto 5">
+            <a:extLst>
+              <a:ext uri="{FF2B5EF4-FFF2-40B4-BE49-F238E27FC236}">
+                <a16:creationId xmlns:a16="http://schemas.microsoft.com/office/drawing/2014/main" id="{A4B916A2-1658-459F-B90F-44159EE8BE99}"/>
               </a:ext>
             </a:extLst>
           </p:cNvPr>
@@ -11111,8 +11135,8 @@
         </p:nvSpPr>
         <p:spPr>
           <a:xfrm>
-            <a:off x="2037415" y="2120949"/>
-            <a:ext cx="8117169" cy="2616101"/>
+            <a:off x="2884572" y="1074561"/>
+            <a:ext cx="6422857" cy="400110"/>
           </a:xfrm>
           <a:prstGeom prst="rect">
             <a:avLst/>
@@ -11125,106 +11149,22 @@
           </a:bodyPr>
           <a:lstStyle/>
           <a:p>
-            <a:pPr marL="285750" indent="-285750" algn="just">
-              <a:buFont typeface="Arial" panose="020B0604020202020204" pitchFamily="34" charset="0"/>
-              <a:buChar char="•"/>
-            </a:pPr>
-            <a:r>
-              <a:rPr lang="pt-BR" dirty="0">
-                <a:latin typeface="Trebuchet MS" panose="020B0603020202020204" pitchFamily="34" charset="0"/>
-              </a:rPr>
-              <a:t>O estágio atual de desenvolvimento do projeto já permite que o SGC seja utilizado para Gerenciamento e Visualização do acervo do </a:t>
-            </a:r>
-            <a:r>
-              <a:rPr lang="pt-BR" b="1" dirty="0">
-                <a:latin typeface="Trebuchet MS" panose="020B0603020202020204" pitchFamily="34" charset="0"/>
-              </a:rPr>
-              <a:t>Museu Dom João VI</a:t>
-            </a:r>
-            <a:r>
-              <a:rPr lang="pt-BR" dirty="0">
-                <a:latin typeface="Trebuchet MS" panose="020B0603020202020204" pitchFamily="34" charset="0"/>
-              </a:rPr>
-              <a:t>. </a:t>
-            </a:r>
-          </a:p>
-          <a:p>
-            <a:pPr marL="285750" indent="-285750" algn="just">
-              <a:buFont typeface="Arial" panose="020B0604020202020204" pitchFamily="34" charset="0"/>
-              <a:buChar char="•"/>
-            </a:pPr>
-            <a:endParaRPr lang="pt-BR" dirty="0">
-              <a:latin typeface="Trebuchet MS" panose="020B0603020202020204" pitchFamily="34" charset="0"/>
-            </a:endParaRPr>
-          </a:p>
-          <a:p>
-            <a:pPr marL="285750" indent="-285750" algn="just">
-              <a:buFont typeface="Arial" panose="020B0604020202020204" pitchFamily="34" charset="0"/>
-              <a:buChar char="•"/>
-            </a:pPr>
-            <a:r>
-              <a:rPr lang="pt-BR" dirty="0">
-                <a:latin typeface="Trebuchet MS" panose="020B0603020202020204" pitchFamily="34" charset="0"/>
-              </a:rPr>
-              <a:t>A implementação do SGC permitirá:</a:t>
-            </a:r>
-          </a:p>
-          <a:p>
-            <a:pPr marL="285750" indent="-285750" algn="just">
-              <a:buFont typeface="Arial" panose="020B0604020202020204" pitchFamily="34" charset="0"/>
-              <a:buChar char="•"/>
-            </a:pPr>
-            <a:endParaRPr lang="pt-BR" dirty="0">
-              <a:latin typeface="Trebuchet MS" panose="020B0603020202020204" pitchFamily="34" charset="0"/>
-            </a:endParaRPr>
-          </a:p>
-          <a:p>
-            <a:pPr marL="742950" lvl="1" indent="-285750" algn="just">
-              <a:buFont typeface="Wingdings" panose="05000000000000000000" pitchFamily="2" charset="2"/>
-              <a:buChar char="Ø"/>
-            </a:pPr>
-            <a:r>
-              <a:rPr lang="pt-BR" sz="1400" dirty="0">
-                <a:latin typeface="Trebuchet MS" panose="020B0603020202020204" pitchFamily="34" charset="0"/>
-              </a:rPr>
-              <a:t>Atualização e manutenção dos registros do acervo de forma mais fácil;</a:t>
-            </a:r>
-          </a:p>
-          <a:p>
-            <a:pPr marL="742950" lvl="1" indent="-285750" algn="just">
-              <a:buFont typeface="Wingdings" panose="05000000000000000000" pitchFamily="2" charset="2"/>
-              <a:buChar char="Ø"/>
-            </a:pPr>
-            <a:r>
-              <a:rPr lang="pt-BR" sz="1400" dirty="0">
-                <a:latin typeface="Trebuchet MS" panose="020B0603020202020204" pitchFamily="34" charset="0"/>
-              </a:rPr>
-              <a:t>A possibilidade de edição de conteúdo por qualquer colaborador cadastrado e através de qualquer computador com acesso ao servidor web;</a:t>
-            </a:r>
-          </a:p>
-          <a:p>
-            <a:pPr marL="742950" lvl="1" indent="-285750" algn="just">
-              <a:buFont typeface="Wingdings" panose="05000000000000000000" pitchFamily="2" charset="2"/>
-              <a:buChar char="Ø"/>
-            </a:pPr>
-            <a:r>
-              <a:rPr lang="pt-BR" sz="1400" dirty="0">
-                <a:latin typeface="Trebuchet MS" panose="020B0603020202020204" pitchFamily="34" charset="0"/>
-              </a:rPr>
-              <a:t>Disponibilização de todas as ferramentas utilizadas de forma gratuita.</a:t>
-            </a:r>
-            <a:endParaRPr lang="pt-BR" dirty="0">
-              <a:latin typeface="Trebuchet MS" panose="020B0603020202020204" pitchFamily="34" charset="0"/>
-            </a:endParaRPr>
-          </a:p>
-        </p:txBody>
-      </p:sp>
-      <p:sp>
-        <p:nvSpPr>
-          <p:cNvPr id="6" name="CaixaDeTexto 5">
-            <a:extLst>
-              <a:ext uri="{FF2B5EF4-FFF2-40B4-BE49-F238E27FC236}">
-                <a16:creationId xmlns:a16="http://schemas.microsoft.com/office/drawing/2014/main" id="{A3A71C5D-2C1D-40B6-BB78-061E9F369E08}"/>
+            <a:pPr algn="ctr"/>
+            <a:r>
+              <a:rPr lang="pt-BR" sz="2000" b="1" dirty="0">
+                <a:latin typeface="Trebuchet MS" panose="020B0603020202020204" pitchFamily="34" charset="0"/>
+              </a:rPr>
+              <a:t>Apresentação do Protótipo</a:t>
+            </a:r>
+          </a:p>
+        </p:txBody>
+      </p:sp>
+      <p:sp>
+        <p:nvSpPr>
+          <p:cNvPr id="8" name="CaixaDeTexto 7">
+            <a:extLst>
+              <a:ext uri="{FF2B5EF4-FFF2-40B4-BE49-F238E27FC236}">
+                <a16:creationId xmlns:a16="http://schemas.microsoft.com/office/drawing/2014/main" id="{D425102B-4B19-47D9-81F6-6D23D202382D}"/>
               </a:ext>
             </a:extLst>
           </p:cNvPr>
@@ -11233,8 +11173,8 @@
         </p:nvSpPr>
         <p:spPr>
           <a:xfrm>
-            <a:off x="2884572" y="1074561"/>
-            <a:ext cx="6422857" cy="400110"/>
+            <a:off x="2037415" y="2263237"/>
+            <a:ext cx="8117169" cy="2308324"/>
           </a:xfrm>
           <a:prstGeom prst="rect">
             <a:avLst/>
@@ -11247,12 +11187,348 @@
           </a:bodyPr>
           <a:lstStyle/>
           <a:p>
+            <a:pPr marL="285750" indent="-285750" algn="just">
+              <a:buFont typeface="Arial" panose="020B0604020202020204" pitchFamily="34" charset="0"/>
+              <a:buChar char="•"/>
+            </a:pPr>
+            <a:r>
+              <a:rPr lang="pt-BR" dirty="0">
+                <a:latin typeface="Trebuchet MS" panose="020B0603020202020204" pitchFamily="34" charset="0"/>
+              </a:rPr>
+              <a:t>Criado protótipo do site utilizando o Google Cloud;</a:t>
+            </a:r>
+          </a:p>
+          <a:p>
+            <a:pPr marL="285750" indent="-285750" algn="just">
+              <a:buFont typeface="Arial" panose="020B0604020202020204" pitchFamily="34" charset="0"/>
+              <a:buChar char="•"/>
+            </a:pPr>
+            <a:endParaRPr lang="pt-BR" dirty="0">
+              <a:latin typeface="Trebuchet MS" panose="020B0603020202020204" pitchFamily="34" charset="0"/>
+            </a:endParaRPr>
+          </a:p>
+          <a:p>
+            <a:pPr marL="285750" indent="-285750" algn="just">
+              <a:buFont typeface="Arial" panose="020B0604020202020204" pitchFamily="34" charset="0"/>
+              <a:buChar char="•"/>
+            </a:pPr>
+            <a:r>
+              <a:rPr lang="pt-BR" dirty="0">
+                <a:latin typeface="Trebuchet MS" panose="020B0603020202020204" pitchFamily="34" charset="0"/>
+              </a:rPr>
+              <a:t>Permite teste e aprendizado em um ambiente controlado.</a:t>
+            </a:r>
+          </a:p>
+          <a:p>
+            <a:pPr algn="just"/>
+            <a:endParaRPr lang="pt-BR" dirty="0">
+              <a:latin typeface="Trebuchet MS" panose="020B0603020202020204" pitchFamily="34" charset="0"/>
+            </a:endParaRPr>
+          </a:p>
+          <a:p>
+            <a:endParaRPr lang="pt-BR" dirty="0">
+              <a:latin typeface="Trebuchet MS" panose="020B0603020202020204" pitchFamily="34" charset="0"/>
+            </a:endParaRPr>
+          </a:p>
+          <a:p>
+            <a:r>
+              <a:rPr lang="pt-BR" dirty="0">
+                <a:latin typeface="Trebuchet MS" panose="020B0603020202020204" pitchFamily="34" charset="0"/>
+              </a:rPr>
+              <a:t>Link do Providence: </a:t>
+            </a:r>
+            <a:r>
+              <a:rPr lang="pt-BR" dirty="0">
+                <a:latin typeface="Trebuchet MS" panose="020B0603020202020204" pitchFamily="34" charset="0"/>
+                <a:hlinkClick r:id="rId2"/>
+              </a:rPr>
+              <a:t>http://35.227.36.216/admin/</a:t>
+            </a:r>
+            <a:endParaRPr lang="pt-BR" dirty="0">
+              <a:latin typeface="Trebuchet MS" panose="020B0603020202020204" pitchFamily="34" charset="0"/>
+            </a:endParaRPr>
+          </a:p>
+          <a:p>
+            <a:pPr marL="285750" indent="-285750">
+              <a:buFont typeface="Arial" panose="020B0604020202020204" pitchFamily="34" charset="0"/>
+              <a:buChar char="•"/>
+            </a:pPr>
+            <a:endParaRPr lang="pt-BR" dirty="0">
+              <a:latin typeface="Trebuchet MS" panose="020B0603020202020204" pitchFamily="34" charset="0"/>
+            </a:endParaRPr>
+          </a:p>
+          <a:p>
+            <a:r>
+              <a:rPr lang="pt-BR" dirty="0">
+                <a:latin typeface="Trebuchet MS" panose="020B0603020202020204" pitchFamily="34" charset="0"/>
+              </a:rPr>
+              <a:t>Link do </a:t>
+            </a:r>
+            <a:r>
+              <a:rPr lang="pt-BR" dirty="0" err="1">
+                <a:latin typeface="Trebuchet MS" panose="020B0603020202020204" pitchFamily="34" charset="0"/>
+              </a:rPr>
+              <a:t>Pawtucket</a:t>
+            </a:r>
+            <a:r>
+              <a:rPr lang="pt-BR" dirty="0">
+                <a:latin typeface="Trebuchet MS" panose="020B0603020202020204" pitchFamily="34" charset="0"/>
+              </a:rPr>
+              <a:t>: </a:t>
+            </a:r>
+            <a:r>
+              <a:rPr lang="pt-BR" dirty="0">
+                <a:latin typeface="Trebuchet MS" panose="020B0603020202020204" pitchFamily="34" charset="0"/>
+                <a:hlinkClick r:id="rId3"/>
+              </a:rPr>
+              <a:t>http://35.227.36.216/</a:t>
+            </a:r>
+            <a:endParaRPr lang="pt-BR" dirty="0">
+              <a:latin typeface="Trebuchet MS" panose="020B0603020202020204" pitchFamily="34" charset="0"/>
+            </a:endParaRPr>
+          </a:p>
+        </p:txBody>
+      </p:sp>
+    </p:spTree>
+    <p:extLst>
+      <p:ext uri="{BB962C8B-B14F-4D97-AF65-F5344CB8AC3E}">
+        <p14:creationId xmlns:p14="http://schemas.microsoft.com/office/powerpoint/2010/main" val="2989390088"/>
+      </p:ext>
+    </p:extLst>
+  </p:cSld>
+  <p:clrMapOvr>
+    <a:masterClrMapping/>
+  </p:clrMapOvr>
+</p:sld>
+</file>
+
+<file path=ppt/slides/slide35.xml><?xml version="1.0" encoding="utf-8"?>
+<p:sld xmlns:a="http://schemas.openxmlformats.org/drawingml/2006/main" xmlns:r="http://schemas.openxmlformats.org/officeDocument/2006/relationships" xmlns:p="http://schemas.openxmlformats.org/presentationml/2006/main">
+  <p:cSld>
+    <p:spTree>
+      <p:nvGrpSpPr>
+        <p:cNvPr id="1" name=""/>
+        <p:cNvGrpSpPr/>
+        <p:nvPr/>
+      </p:nvGrpSpPr>
+      <p:grpSpPr>
+        <a:xfrm>
+          <a:off x="0" y="0"/>
+          <a:ext cx="0" cy="0"/>
+          <a:chOff x="0" y="0"/>
+          <a:chExt cx="0" cy="0"/>
+        </a:xfrm>
+      </p:grpSpPr>
+      <p:sp>
+        <p:nvSpPr>
+          <p:cNvPr id="4" name="Retângulo 3"/>
+          <p:cNvSpPr/>
+          <p:nvPr/>
+        </p:nvSpPr>
+        <p:spPr>
+          <a:xfrm>
+            <a:off x="395536" y="368204"/>
+            <a:ext cx="4860032" cy="615553"/>
+          </a:xfrm>
+          <a:prstGeom prst="rect">
+            <a:avLst/>
+          </a:prstGeom>
+          <a:noFill/>
+        </p:spPr>
+        <p:txBody>
+          <a:bodyPr wrap="square">
+            <a:spAutoFit/>
+          </a:bodyPr>
+          <a:lstStyle/>
+          <a:p>
+            <a:pPr marL="0" indent="0">
+              <a:buNone/>
+            </a:pPr>
+            <a:r>
+              <a:rPr lang="pt-BR" sz="1400" b="1" dirty="0">
+                <a:latin typeface="Trebuchet MS" panose="020B0603020202020204" pitchFamily="34" charset="0"/>
+              </a:rPr>
+              <a:t>CONCLUSÃO</a:t>
+            </a:r>
+          </a:p>
+          <a:p>
+            <a:pPr>
+              <a:defRPr/>
+            </a:pPr>
+            <a:r>
+              <a:rPr lang="pt-BR" altLang="pt-BR" sz="2000" dirty="0">
+                <a:solidFill>
+                  <a:schemeClr val="accent1"/>
+                </a:solidFill>
+                <a:latin typeface="Trebuchet MS" pitchFamily="34" charset="0"/>
+              </a:rPr>
+              <a:t>—</a:t>
+            </a:r>
+            <a:endParaRPr lang="pt-BR" sz="2000" b="1" dirty="0">
+              <a:solidFill>
+                <a:schemeClr val="accent1"/>
+              </a:solidFill>
+              <a:latin typeface="Trebuchet MS" pitchFamily="34" charset="0"/>
+            </a:endParaRPr>
+          </a:p>
+        </p:txBody>
+      </p:sp>
+      <p:sp>
+        <p:nvSpPr>
+          <p:cNvPr id="5" name="CaixaDeTexto 4">
+            <a:extLst>
+              <a:ext uri="{FF2B5EF4-FFF2-40B4-BE49-F238E27FC236}">
+                <a16:creationId xmlns:a16="http://schemas.microsoft.com/office/drawing/2014/main" id="{2423AE67-F059-4ADA-8CBA-9B51FE24A270}"/>
+              </a:ext>
+            </a:extLst>
+          </p:cNvPr>
+          <p:cNvSpPr txBox="1"/>
+          <p:nvPr/>
+        </p:nvSpPr>
+        <p:spPr>
+          <a:xfrm>
+            <a:off x="2037415" y="2120949"/>
+            <a:ext cx="8117169" cy="2616101"/>
+          </a:xfrm>
+          <a:prstGeom prst="rect">
+            <a:avLst/>
+          </a:prstGeom>
+          <a:noFill/>
+        </p:spPr>
+        <p:txBody>
+          <a:bodyPr wrap="square" rtlCol="0">
+            <a:spAutoFit/>
+          </a:bodyPr>
+          <a:lstStyle/>
+          <a:p>
+            <a:pPr marL="285750" indent="-285750" algn="just">
+              <a:buFont typeface="Arial" panose="020B0604020202020204" pitchFamily="34" charset="0"/>
+              <a:buChar char="•"/>
+            </a:pPr>
+            <a:r>
+              <a:rPr lang="pt-BR" dirty="0">
+                <a:latin typeface="Trebuchet MS" panose="020B0603020202020204" pitchFamily="34" charset="0"/>
+              </a:rPr>
+              <a:t>O estágio atual de desenvolvimento do projeto já permite que o SGC seja utilizado para Gerenciamento e Visualização do acervo do </a:t>
+            </a:r>
+            <a:r>
+              <a:rPr lang="pt-BR" b="1" dirty="0">
+                <a:latin typeface="Trebuchet MS" panose="020B0603020202020204" pitchFamily="34" charset="0"/>
+              </a:rPr>
+              <a:t>Museu Dom João VI</a:t>
+            </a:r>
+            <a:r>
+              <a:rPr lang="pt-BR" dirty="0">
+                <a:latin typeface="Trebuchet MS" panose="020B0603020202020204" pitchFamily="34" charset="0"/>
+              </a:rPr>
+              <a:t>. </a:t>
+            </a:r>
+          </a:p>
+          <a:p>
+            <a:pPr marL="285750" indent="-285750" algn="just">
+              <a:buFont typeface="Arial" panose="020B0604020202020204" pitchFamily="34" charset="0"/>
+              <a:buChar char="•"/>
+            </a:pPr>
+            <a:endParaRPr lang="pt-BR" dirty="0">
+              <a:latin typeface="Trebuchet MS" panose="020B0603020202020204" pitchFamily="34" charset="0"/>
+            </a:endParaRPr>
+          </a:p>
+          <a:p>
+            <a:pPr marL="285750" indent="-285750" algn="just">
+              <a:buFont typeface="Arial" panose="020B0604020202020204" pitchFamily="34" charset="0"/>
+              <a:buChar char="•"/>
+            </a:pPr>
+            <a:r>
+              <a:rPr lang="pt-BR" dirty="0">
+                <a:latin typeface="Trebuchet MS" panose="020B0603020202020204" pitchFamily="34" charset="0"/>
+              </a:rPr>
+              <a:t>A implementação do SGC permitirá:</a:t>
+            </a:r>
+          </a:p>
+          <a:p>
+            <a:pPr marL="285750" indent="-285750" algn="just">
+              <a:buFont typeface="Arial" panose="020B0604020202020204" pitchFamily="34" charset="0"/>
+              <a:buChar char="•"/>
+            </a:pPr>
+            <a:endParaRPr lang="pt-BR" dirty="0">
+              <a:latin typeface="Trebuchet MS" panose="020B0603020202020204" pitchFamily="34" charset="0"/>
+            </a:endParaRPr>
+          </a:p>
+          <a:p>
+            <a:pPr marL="742950" lvl="1" indent="-285750" algn="just">
+              <a:buFont typeface="Wingdings" panose="05000000000000000000" pitchFamily="2" charset="2"/>
+              <a:buChar char="Ø"/>
+            </a:pPr>
+            <a:r>
+              <a:rPr lang="pt-BR" sz="1400" dirty="0">
+                <a:latin typeface="Trebuchet MS" panose="020B0603020202020204" pitchFamily="34" charset="0"/>
+              </a:rPr>
+              <a:t>Atualização e manutenção dos registros do acervo de forma mais fácil;</a:t>
+            </a:r>
+          </a:p>
+          <a:p>
+            <a:pPr marL="742950" lvl="1" indent="-285750" algn="just">
+              <a:buFont typeface="Wingdings" panose="05000000000000000000" pitchFamily="2" charset="2"/>
+              <a:buChar char="Ø"/>
+            </a:pPr>
+            <a:r>
+              <a:rPr lang="pt-BR" sz="1400" dirty="0">
+                <a:latin typeface="Trebuchet MS" panose="020B0603020202020204" pitchFamily="34" charset="0"/>
+              </a:rPr>
+              <a:t>A possibilidade de edição de conteúdo por qualquer colaborador cadastrado e através de qualquer computador com acesso ao servidor web;</a:t>
+            </a:r>
+          </a:p>
+          <a:p>
+            <a:pPr marL="742950" lvl="1" indent="-285750" algn="just">
+              <a:buFont typeface="Wingdings" panose="05000000000000000000" pitchFamily="2" charset="2"/>
+              <a:buChar char="Ø"/>
+            </a:pPr>
+            <a:r>
+              <a:rPr lang="pt-BR" sz="1400" dirty="0">
+                <a:latin typeface="Trebuchet MS" panose="020B0603020202020204" pitchFamily="34" charset="0"/>
+              </a:rPr>
+              <a:t>Disponibilização de todas as ferramentas utilizadas de forma gratuita.</a:t>
+            </a:r>
+            <a:endParaRPr lang="pt-BR" dirty="0">
+              <a:latin typeface="Trebuchet MS" panose="020B0603020202020204" pitchFamily="34" charset="0"/>
+            </a:endParaRPr>
+          </a:p>
+        </p:txBody>
+      </p:sp>
+      <p:sp>
+        <p:nvSpPr>
+          <p:cNvPr id="6" name="CaixaDeTexto 5">
+            <a:extLst>
+              <a:ext uri="{FF2B5EF4-FFF2-40B4-BE49-F238E27FC236}">
+                <a16:creationId xmlns:a16="http://schemas.microsoft.com/office/drawing/2014/main" id="{A3A71C5D-2C1D-40B6-BB78-061E9F369E08}"/>
+              </a:ext>
+            </a:extLst>
+          </p:cNvPr>
+          <p:cNvSpPr txBox="1"/>
+          <p:nvPr/>
+        </p:nvSpPr>
+        <p:spPr>
+          <a:xfrm>
+            <a:off x="2884572" y="1074561"/>
+            <a:ext cx="6422857" cy="400110"/>
+          </a:xfrm>
+          <a:prstGeom prst="rect">
+            <a:avLst/>
+          </a:prstGeom>
+          <a:noFill/>
+        </p:spPr>
+        <p:txBody>
+          <a:bodyPr wrap="square" rtlCol="0">
+            <a:spAutoFit/>
+          </a:bodyPr>
+          <a:lstStyle/>
+          <a:p>
             <a:pPr algn="ctr"/>
             <a:r>
               <a:rPr lang="pt-BR" sz="2000" b="1" dirty="0">
                 <a:latin typeface="Trebuchet MS" panose="020B0603020202020204" pitchFamily="34" charset="0"/>
               </a:rPr>
-              <a:t>Situação Atual</a:t>
+              <a:t>Conclusão</a:t>
             </a:r>
           </a:p>
         </p:txBody>
@@ -11270,7 +11546,7 @@
 </p:sld>
 </file>
 
-<file path=ppt/slides/slide35.xml><?xml version="1.0" encoding="utf-8"?>
+<file path=ppt/slides/slide36.xml><?xml version="1.0" encoding="utf-8"?>
 <p:sld xmlns:a="http://schemas.openxmlformats.org/drawingml/2006/main" xmlns:r="http://schemas.openxmlformats.org/officeDocument/2006/relationships" xmlns:p="http://schemas.openxmlformats.org/presentationml/2006/main">
   <p:cSld>
     <p:spTree>

</xml_diff>